<commit_message>
- fix bug #92, #93, #98, #99 - update slide
</commit_message>
<xml_diff>
--- a/Report/ppt/Presentation.pptx
+++ b/Report/ppt/Presentation.pptx
@@ -5,7 +5,7 @@
     <p:sldMasterId id="2147483792" r:id="rId1"/>
   </p:sldMasterIdLst>
   <p:notesMasterIdLst>
-    <p:notesMasterId r:id="rId12"/>
+    <p:notesMasterId r:id="rId24"/>
   </p:notesMasterIdLst>
   <p:sldIdLst>
     <p:sldId id="256" r:id="rId2"/>
@@ -14,10 +14,22 @@
     <p:sldId id="259" r:id="rId5"/>
     <p:sldId id="260" r:id="rId6"/>
     <p:sldId id="261" r:id="rId7"/>
-    <p:sldId id="262" r:id="rId8"/>
-    <p:sldId id="263" r:id="rId9"/>
-    <p:sldId id="264" r:id="rId10"/>
-    <p:sldId id="265" r:id="rId11"/>
+    <p:sldId id="266" r:id="rId8"/>
+    <p:sldId id="267" r:id="rId9"/>
+    <p:sldId id="262" r:id="rId10"/>
+    <p:sldId id="268" r:id="rId11"/>
+    <p:sldId id="270" r:id="rId12"/>
+    <p:sldId id="271" r:id="rId13"/>
+    <p:sldId id="269" r:id="rId14"/>
+    <p:sldId id="272" r:id="rId15"/>
+    <p:sldId id="273" r:id="rId16"/>
+    <p:sldId id="274" r:id="rId17"/>
+    <p:sldId id="275" r:id="rId18"/>
+    <p:sldId id="276" r:id="rId19"/>
+    <p:sldId id="277" r:id="rId20"/>
+    <p:sldId id="263" r:id="rId21"/>
+    <p:sldId id="264" r:id="rId22"/>
+    <p:sldId id="265" r:id="rId23"/>
   </p:sldIdLst>
   <p:sldSz cx="9144000" cy="6858000" type="screen4x3"/>
   <p:notesSz cx="6858000" cy="9144000"/>
@@ -201,7 +213,7 @@
           <a:p>
             <a:fld id="{4C715847-7B4D-45DD-A2D4-9F51B7F9D7CE}" type="datetimeFigureOut">
               <a:rPr lang="en-US" smtClean="0"/>
-              <a:t>23/06/2012</a:t>
+              <a:t>05/07/2012</a:t>
             </a:fld>
             <a:endParaRPr lang="en-US"/>
           </a:p>
@@ -802,7 +814,7 @@
             <a:fld id="{1D8BD707-D9CF-40AE-B4C6-C98DA3205C09}" type="datetimeFigureOut">
               <a:rPr lang="en-US" smtClean="0"/>
               <a:pPr/>
-              <a:t>23/06/2012</a:t>
+              <a:t>05/07/2012</a:t>
             </a:fld>
             <a:endParaRPr lang="en-US"/>
           </a:p>
@@ -1027,7 +1039,7 @@
             <a:fld id="{1D8BD707-D9CF-40AE-B4C6-C98DA3205C09}" type="datetimeFigureOut">
               <a:rPr lang="en-US" smtClean="0"/>
               <a:pPr/>
-              <a:t>23/06/2012</a:t>
+              <a:t>05/07/2012</a:t>
             </a:fld>
             <a:endParaRPr lang="en-US"/>
           </a:p>
@@ -1309,7 +1321,7 @@
             <a:fld id="{1D8BD707-D9CF-40AE-B4C6-C98DA3205C09}" type="datetimeFigureOut">
               <a:rPr lang="en-US" smtClean="0"/>
               <a:pPr/>
-              <a:t>23/06/2012</a:t>
+              <a:t>05/07/2012</a:t>
             </a:fld>
             <a:endParaRPr lang="en-US"/>
           </a:p>
@@ -1490,7 +1502,7 @@
             <a:fld id="{1D8BD707-D9CF-40AE-B4C6-C98DA3205C09}" type="datetimeFigureOut">
               <a:rPr lang="en-US" smtClean="0"/>
               <a:pPr/>
-              <a:t>23/06/2012</a:t>
+              <a:t>05/07/2012</a:t>
             </a:fld>
             <a:endParaRPr lang="en-US"/>
           </a:p>
@@ -1850,7 +1862,7 @@
             <a:fld id="{1D8BD707-D9CF-40AE-B4C6-C98DA3205C09}" type="datetimeFigureOut">
               <a:rPr lang="en-US" smtClean="0"/>
               <a:pPr/>
-              <a:t>23/06/2012</a:t>
+              <a:t>05/07/2012</a:t>
             </a:fld>
             <a:endParaRPr lang="en-US"/>
           </a:p>
@@ -2139,7 +2151,7 @@
             <a:fld id="{1D8BD707-D9CF-40AE-B4C6-C98DA3205C09}" type="datetimeFigureOut">
               <a:rPr lang="en-US" smtClean="0"/>
               <a:pPr/>
-              <a:t>23/06/2012</a:t>
+              <a:t>05/07/2012</a:t>
             </a:fld>
             <a:endParaRPr lang="en-US"/>
           </a:p>
@@ -2563,7 +2575,7 @@
             <a:fld id="{1D8BD707-D9CF-40AE-B4C6-C98DA3205C09}" type="datetimeFigureOut">
               <a:rPr lang="en-US" smtClean="0"/>
               <a:pPr/>
-              <a:t>23/06/2012</a:t>
+              <a:t>05/07/2012</a:t>
             </a:fld>
             <a:endParaRPr lang="en-US"/>
           </a:p>
@@ -2680,7 +2692,7 @@
             <a:fld id="{1D8BD707-D9CF-40AE-B4C6-C98DA3205C09}" type="datetimeFigureOut">
               <a:rPr lang="en-US" smtClean="0"/>
               <a:pPr/>
-              <a:t>23/06/2012</a:t>
+              <a:t>05/07/2012</a:t>
             </a:fld>
             <a:endParaRPr lang="en-US"/>
           </a:p>
@@ -2772,7 +2784,7 @@
             <a:fld id="{1D8BD707-D9CF-40AE-B4C6-C98DA3205C09}" type="datetimeFigureOut">
               <a:rPr lang="en-US" smtClean="0"/>
               <a:pPr/>
-              <a:t>23/06/2012</a:t>
+              <a:t>05/07/2012</a:t>
             </a:fld>
             <a:endParaRPr lang="en-US"/>
           </a:p>
@@ -3052,7 +3064,7 @@
             <a:fld id="{1D8BD707-D9CF-40AE-B4C6-C98DA3205C09}" type="datetimeFigureOut">
               <a:rPr lang="en-US" smtClean="0"/>
               <a:pPr/>
-              <a:t>23/06/2012</a:t>
+              <a:t>05/07/2012</a:t>
             </a:fld>
             <a:endParaRPr lang="en-US"/>
           </a:p>
@@ -3420,7 +3432,7 @@
             <a:fld id="{1D8BD707-D9CF-40AE-B4C6-C98DA3205C09}" type="datetimeFigureOut">
               <a:rPr lang="en-US" smtClean="0"/>
               <a:pPr/>
-              <a:t>23/06/2012</a:t>
+              <a:t>05/07/2012</a:t>
             </a:fld>
             <a:endParaRPr lang="en-US"/>
           </a:p>
@@ -3859,7 +3871,7 @@
             <a:fld id="{1D8BD707-D9CF-40AE-B4C6-C98DA3205C09}" type="datetimeFigureOut">
               <a:rPr lang="en-US" smtClean="0"/>
               <a:pPr/>
-              <a:t>23/06/2012</a:t>
+              <a:t>05/07/2012</a:t>
             </a:fld>
             <a:endParaRPr lang="en-US"/>
           </a:p>
@@ -4348,7 +4360,6 @@
               <a:rPr lang="en-US" sz="3200"/>
               <a:t>VỆ LUẬN VĂN TỐT NGHIỆP</a:t>
             </a:r>
-            <a:endParaRPr lang="en-US" sz="3200"/>
           </a:p>
         </p:txBody>
       </p:sp>
@@ -4492,6 +4503,1887 @@
       </p:grpSpPr>
       <p:sp>
         <p:nvSpPr>
+          <p:cNvPr id="2" name="Title 1"/>
+          <p:cNvSpPr>
+            <a:spLocks noGrp="1"/>
+          </p:cNvSpPr>
+          <p:nvPr>
+            <p:ph type="title"/>
+          </p:nvPr>
+        </p:nvSpPr>
+        <p:spPr/>
+        <p:txBody>
+          <a:bodyPr/>
+          <a:lstStyle/>
+          <a:p>
+            <a:r>
+              <a:rPr lang="en-US" smtClean="0"/>
+              <a:t>Yêu cầu hệ thống</a:t>
+            </a:r>
+            <a:endParaRPr lang="en-US"/>
+          </a:p>
+        </p:txBody>
+      </p:sp>
+      <p:sp>
+        <p:nvSpPr>
+          <p:cNvPr id="3" name="Content Placeholder 2"/>
+          <p:cNvSpPr>
+            <a:spLocks noGrp="1"/>
+          </p:cNvSpPr>
+          <p:nvPr>
+            <p:ph idx="1"/>
+          </p:nvPr>
+        </p:nvSpPr>
+        <p:spPr/>
+        <p:txBody>
+          <a:bodyPr/>
+          <a:lstStyle/>
+          <a:p>
+            <a:r>
+              <a:rPr lang="en-US" smtClean="0"/>
+              <a:t>Hệ quản trị cơ sở dữ liệu MySQL</a:t>
+            </a:r>
+          </a:p>
+          <a:p>
+            <a:r>
+              <a:rPr lang="en-US" smtClean="0"/>
+              <a:t>Web server Apache Tomcat</a:t>
+            </a:r>
+          </a:p>
+          <a:p>
+            <a:r>
+              <a:rPr lang="en-US" smtClean="0"/>
+              <a:t>Trình duyệt IE8+, FireFox 12+, Chrome 19+</a:t>
+            </a:r>
+            <a:endParaRPr lang="en-US"/>
+          </a:p>
+        </p:txBody>
+      </p:sp>
+    </p:spTree>
+    <p:extLst>
+      <p:ext uri="{BB962C8B-B14F-4D97-AF65-F5344CB8AC3E}">
+        <p14:creationId xmlns:p14="http://schemas.microsoft.com/office/powerpoint/2010/main" val="2286124339"/>
+      </p:ext>
+    </p:extLst>
+  </p:cSld>
+  <p:clrMapOvr>
+    <a:masterClrMapping/>
+  </p:clrMapOvr>
+</p:sld>
+</file>
+
+<file path=ppt/slides/slide11.xml><?xml version="1.0" encoding="utf-8"?>
+<p:sld xmlns:a="http://schemas.openxmlformats.org/drawingml/2006/main" xmlns:r="http://schemas.openxmlformats.org/officeDocument/2006/relationships" xmlns:p="http://schemas.openxmlformats.org/presentationml/2006/main">
+  <p:cSld>
+    <p:spTree>
+      <p:nvGrpSpPr>
+        <p:cNvPr id="1" name=""/>
+        <p:cNvGrpSpPr/>
+        <p:nvPr/>
+      </p:nvGrpSpPr>
+      <p:grpSpPr>
+        <a:xfrm>
+          <a:off x="0" y="0"/>
+          <a:ext cx="0" cy="0"/>
+          <a:chOff x="0" y="0"/>
+          <a:chExt cx="0" cy="0"/>
+        </a:xfrm>
+      </p:grpSpPr>
+      <p:sp>
+        <p:nvSpPr>
+          <p:cNvPr id="2" name="Title 1"/>
+          <p:cNvSpPr>
+            <a:spLocks noGrp="1"/>
+          </p:cNvSpPr>
+          <p:nvPr>
+            <p:ph type="title"/>
+          </p:nvPr>
+        </p:nvSpPr>
+        <p:spPr/>
+        <p:txBody>
+          <a:bodyPr/>
+          <a:lstStyle/>
+          <a:p>
+            <a:r>
+              <a:rPr lang="en-US" smtClean="0"/>
+              <a:t>Kiến trúc tổng quan(1/2)</a:t>
+            </a:r>
+            <a:endParaRPr lang="en-US"/>
+          </a:p>
+        </p:txBody>
+      </p:sp>
+      <p:sp>
+        <p:nvSpPr>
+          <p:cNvPr id="3" name="Content Placeholder 2"/>
+          <p:cNvSpPr>
+            <a:spLocks noGrp="1"/>
+          </p:cNvSpPr>
+          <p:nvPr>
+            <p:ph idx="1"/>
+          </p:nvPr>
+        </p:nvSpPr>
+        <p:spPr/>
+        <p:txBody>
+          <a:bodyPr/>
+          <a:lstStyle/>
+          <a:p>
+            <a:endParaRPr lang="en-US"/>
+          </a:p>
+        </p:txBody>
+      </p:sp>
+      <p:sp>
+        <p:nvSpPr>
+          <p:cNvPr id="4" name="Rectangle 2"/>
+          <p:cNvSpPr>
+            <a:spLocks noChangeArrowheads="1"/>
+          </p:cNvSpPr>
+          <p:nvPr/>
+        </p:nvSpPr>
+        <p:spPr bwMode="auto">
+          <a:xfrm>
+            <a:off x="0" y="0"/>
+            <a:ext cx="9144000" cy="0"/>
+          </a:xfrm>
+          <a:prstGeom prst="rect">
+            <a:avLst/>
+          </a:prstGeom>
+          <a:noFill/>
+          <a:ln>
+            <a:noFill/>
+          </a:ln>
+          <a:effectLst/>
+          <a:extLst>
+            <a:ext uri="{909E8E84-426E-40DD-AFC4-6F175D3DCCD1}">
+              <a14:hiddenFill xmlns:a14="http://schemas.microsoft.com/office/drawing/2010/main">
+                <a:solidFill>
+                  <a:schemeClr val="accent1"/>
+                </a:solidFill>
+              </a14:hiddenFill>
+            </a:ext>
+            <a:ext uri="{91240B29-F687-4F45-9708-019B960494DF}">
+              <a14:hiddenLine xmlns:a14="http://schemas.microsoft.com/office/drawing/2010/main" w="9525">
+                <a:solidFill>
+                  <a:schemeClr val="tx1"/>
+                </a:solidFill>
+                <a:miter lim="800000"/>
+                <a:headEnd/>
+                <a:tailEnd/>
+              </a14:hiddenLine>
+            </a:ext>
+            <a:ext uri="{AF507438-7753-43E0-B8FC-AC1667EBCBE1}">
+              <a14:hiddenEffects xmlns:a14="http://schemas.microsoft.com/office/drawing/2010/main">
+                <a:effectLst>
+                  <a:outerShdw dist="35921" dir="2700000" algn="ctr" rotWithShape="0">
+                    <a:schemeClr val="bg2"/>
+                  </a:outerShdw>
+                </a:effectLst>
+              </a14:hiddenEffects>
+            </a:ext>
+          </a:extLst>
+        </p:spPr>
+        <p:txBody>
+          <a:bodyPr vert="horz" wrap="none" lIns="91440" tIns="45720" rIns="91440" bIns="45720" numCol="1" anchor="ctr" anchorCtr="0" compatLnSpc="1">
+            <a:prstTxWarp prst="textNoShape">
+              <a:avLst/>
+            </a:prstTxWarp>
+            <a:spAutoFit/>
+          </a:bodyPr>
+          <a:lstStyle/>
+          <a:p>
+            <a:endParaRPr lang="en-US"/>
+          </a:p>
+        </p:txBody>
+      </p:sp>
+      <p:graphicFrame>
+        <p:nvGraphicFramePr>
+          <p:cNvPr id="5" name="Object 4"/>
+          <p:cNvGraphicFramePr>
+            <a:graphicFrameLocks noChangeAspect="1"/>
+          </p:cNvGraphicFramePr>
+          <p:nvPr>
+            <p:extLst>
+              <p:ext uri="{D42A27DB-BD31-4B8C-83A1-F6EECF244321}">
+                <p14:modId xmlns:p14="http://schemas.microsoft.com/office/powerpoint/2010/main" val="3199059694"/>
+              </p:ext>
+            </p:extLst>
+          </p:nvPr>
+        </p:nvGraphicFramePr>
+        <p:xfrm>
+          <a:off x="628650" y="2743200"/>
+          <a:ext cx="3943350" cy="2971800"/>
+        </p:xfrm>
+        <a:graphic>
+          <a:graphicData uri="http://schemas.openxmlformats.org/presentationml/2006/ole">
+            <mc:AlternateContent xmlns:mc="http://schemas.openxmlformats.org/markup-compatibility/2006">
+              <mc:Choice xmlns:v="urn:schemas-microsoft-com:vml" Requires="v">
+                <p:oleObj spid="_x0000_s2052" r:id="rId3" imgW="3939517" imgH="2968460" progId="Visio.Drawing.11">
+                  <p:embed/>
+                </p:oleObj>
+              </mc:Choice>
+              <mc:Fallback>
+                <p:oleObj r:id="rId3" imgW="3939517" imgH="2968460" progId="Visio.Drawing.11">
+                  <p:embed/>
+                  <p:pic>
+                    <p:nvPicPr>
+                      <p:cNvPr id="0" name="Object 1"/>
+                      <p:cNvPicPr>
+                        <a:picLocks noChangeAspect="1" noChangeArrowheads="1"/>
+                      </p:cNvPicPr>
+                      <p:nvPr/>
+                    </p:nvPicPr>
+                    <p:blipFill>
+                      <a:blip r:embed="rId4">
+                        <a:extLst>
+                          <a:ext uri="{28A0092B-C50C-407E-A947-70E740481C1C}">
+                            <a14:useLocalDpi xmlns:a14="http://schemas.microsoft.com/office/drawing/2010/main" val="0"/>
+                          </a:ext>
+                        </a:extLst>
+                      </a:blip>
+                      <a:srcRect/>
+                      <a:stretch>
+                        <a:fillRect/>
+                      </a:stretch>
+                    </p:blipFill>
+                    <p:spPr bwMode="auto">
+                      <a:xfrm>
+                        <a:off x="628650" y="2743200"/>
+                        <a:ext cx="3943350" cy="2971800"/>
+                      </a:xfrm>
+                      <a:prstGeom prst="rect">
+                        <a:avLst/>
+                      </a:prstGeom>
+                      <a:noFill/>
+                      <a:extLst>
+                        <a:ext uri="{909E8E84-426E-40DD-AFC4-6F175D3DCCD1}">
+                          <a14:hiddenFill xmlns:a14="http://schemas.microsoft.com/office/drawing/2010/main">
+                            <a:solidFill>
+                              <a:srgbClr val="FFFFFF"/>
+                            </a:solidFill>
+                          </a14:hiddenFill>
+                        </a:ext>
+                      </a:extLst>
+                    </p:spPr>
+                  </p:pic>
+                </p:oleObj>
+              </mc:Fallback>
+            </mc:AlternateContent>
+          </a:graphicData>
+        </a:graphic>
+      </p:graphicFrame>
+      <p:pic>
+        <p:nvPicPr>
+          <p:cNvPr id="6" name="Picture 5"/>
+          <p:cNvPicPr/>
+          <p:nvPr/>
+        </p:nvPicPr>
+        <p:blipFill>
+          <a:blip r:embed="rId5"/>
+          <a:stretch>
+            <a:fillRect/>
+          </a:stretch>
+        </p:blipFill>
+        <p:spPr>
+          <a:xfrm>
+            <a:off x="4717713" y="2895600"/>
+            <a:ext cx="3877310" cy="2600325"/>
+          </a:xfrm>
+          <a:prstGeom prst="rect">
+            <a:avLst/>
+          </a:prstGeom>
+        </p:spPr>
+      </p:pic>
+    </p:spTree>
+    <p:extLst>
+      <p:ext uri="{BB962C8B-B14F-4D97-AF65-F5344CB8AC3E}">
+        <p14:creationId xmlns:p14="http://schemas.microsoft.com/office/powerpoint/2010/main" val="273785887"/>
+      </p:ext>
+    </p:extLst>
+  </p:cSld>
+  <p:clrMapOvr>
+    <a:masterClrMapping/>
+  </p:clrMapOvr>
+</p:sld>
+</file>
+
+<file path=ppt/slides/slide12.xml><?xml version="1.0" encoding="utf-8"?>
+<p:sld xmlns:a="http://schemas.openxmlformats.org/drawingml/2006/main" xmlns:r="http://schemas.openxmlformats.org/officeDocument/2006/relationships" xmlns:p="http://schemas.openxmlformats.org/presentationml/2006/main">
+  <p:cSld>
+    <p:spTree>
+      <p:nvGrpSpPr>
+        <p:cNvPr id="1" name=""/>
+        <p:cNvGrpSpPr/>
+        <p:nvPr/>
+      </p:nvGrpSpPr>
+      <p:grpSpPr>
+        <a:xfrm>
+          <a:off x="0" y="0"/>
+          <a:ext cx="0" cy="0"/>
+          <a:chOff x="0" y="0"/>
+          <a:chExt cx="0" cy="0"/>
+        </a:xfrm>
+      </p:grpSpPr>
+      <p:sp>
+        <p:nvSpPr>
+          <p:cNvPr id="2" name="Title 1"/>
+          <p:cNvSpPr>
+            <a:spLocks noGrp="1"/>
+          </p:cNvSpPr>
+          <p:nvPr>
+            <p:ph type="title"/>
+          </p:nvPr>
+        </p:nvSpPr>
+        <p:spPr/>
+        <p:txBody>
+          <a:bodyPr/>
+          <a:lstStyle/>
+          <a:p>
+            <a:r>
+              <a:rPr lang="en-US" smtClean="0"/>
+              <a:t>Kiến trúc tổng quan(2/2)</a:t>
+            </a:r>
+            <a:endParaRPr lang="en-US"/>
+          </a:p>
+        </p:txBody>
+      </p:sp>
+      <p:sp>
+        <p:nvSpPr>
+          <p:cNvPr id="3" name="Content Placeholder 2"/>
+          <p:cNvSpPr>
+            <a:spLocks noGrp="1"/>
+          </p:cNvSpPr>
+          <p:nvPr>
+            <p:ph idx="1"/>
+          </p:nvPr>
+        </p:nvSpPr>
+        <p:spPr/>
+        <p:txBody>
+          <a:bodyPr/>
+          <a:lstStyle/>
+          <a:p>
+            <a:endParaRPr lang="en-US"/>
+          </a:p>
+        </p:txBody>
+      </p:sp>
+      <p:sp>
+        <p:nvSpPr>
+          <p:cNvPr id="4" name="Rectangle 2"/>
+          <p:cNvSpPr>
+            <a:spLocks noChangeArrowheads="1"/>
+          </p:cNvSpPr>
+          <p:nvPr/>
+        </p:nvSpPr>
+        <p:spPr bwMode="auto">
+          <a:xfrm>
+            <a:off x="0" y="0"/>
+            <a:ext cx="9144000" cy="0"/>
+          </a:xfrm>
+          <a:prstGeom prst="rect">
+            <a:avLst/>
+          </a:prstGeom>
+          <a:noFill/>
+          <a:ln>
+            <a:noFill/>
+          </a:ln>
+          <a:effectLst/>
+          <a:extLst>
+            <a:ext uri="{909E8E84-426E-40DD-AFC4-6F175D3DCCD1}">
+              <a14:hiddenFill xmlns:a14="http://schemas.microsoft.com/office/drawing/2010/main">
+                <a:solidFill>
+                  <a:schemeClr val="accent1"/>
+                </a:solidFill>
+              </a14:hiddenFill>
+            </a:ext>
+            <a:ext uri="{91240B29-F687-4F45-9708-019B960494DF}">
+              <a14:hiddenLine xmlns:a14="http://schemas.microsoft.com/office/drawing/2010/main" w="9525">
+                <a:solidFill>
+                  <a:schemeClr val="tx1"/>
+                </a:solidFill>
+                <a:miter lim="800000"/>
+                <a:headEnd/>
+                <a:tailEnd/>
+              </a14:hiddenLine>
+            </a:ext>
+            <a:ext uri="{AF507438-7753-43E0-B8FC-AC1667EBCBE1}">
+              <a14:hiddenEffects xmlns:a14="http://schemas.microsoft.com/office/drawing/2010/main">
+                <a:effectLst>
+                  <a:outerShdw dist="35921" dir="2700000" algn="ctr" rotWithShape="0">
+                    <a:schemeClr val="bg2"/>
+                  </a:outerShdw>
+                </a:effectLst>
+              </a14:hiddenEffects>
+            </a:ext>
+          </a:extLst>
+        </p:spPr>
+        <p:txBody>
+          <a:bodyPr vert="horz" wrap="none" lIns="91440" tIns="45720" rIns="91440" bIns="45720" numCol="1" anchor="ctr" anchorCtr="0" compatLnSpc="1">
+            <a:prstTxWarp prst="textNoShape">
+              <a:avLst/>
+            </a:prstTxWarp>
+            <a:spAutoFit/>
+          </a:bodyPr>
+          <a:lstStyle/>
+          <a:p>
+            <a:endParaRPr lang="en-US"/>
+          </a:p>
+        </p:txBody>
+      </p:sp>
+      <p:sp>
+        <p:nvSpPr>
+          <p:cNvPr id="7" name="Rectangle 2"/>
+          <p:cNvSpPr>
+            <a:spLocks noChangeArrowheads="1"/>
+          </p:cNvSpPr>
+          <p:nvPr/>
+        </p:nvSpPr>
+        <p:spPr bwMode="auto">
+          <a:xfrm>
+            <a:off x="0" y="0"/>
+            <a:ext cx="9144000" cy="0"/>
+          </a:xfrm>
+          <a:prstGeom prst="rect">
+            <a:avLst/>
+          </a:prstGeom>
+          <a:noFill/>
+          <a:ln>
+            <a:noFill/>
+          </a:ln>
+          <a:effectLst/>
+          <a:extLst>
+            <a:ext uri="{909E8E84-426E-40DD-AFC4-6F175D3DCCD1}">
+              <a14:hiddenFill xmlns:a14="http://schemas.microsoft.com/office/drawing/2010/main">
+                <a:solidFill>
+                  <a:schemeClr val="accent1"/>
+                </a:solidFill>
+              </a14:hiddenFill>
+            </a:ext>
+            <a:ext uri="{91240B29-F687-4F45-9708-019B960494DF}">
+              <a14:hiddenLine xmlns:a14="http://schemas.microsoft.com/office/drawing/2010/main" w="9525">
+                <a:solidFill>
+                  <a:schemeClr val="tx1"/>
+                </a:solidFill>
+                <a:miter lim="800000"/>
+                <a:headEnd/>
+                <a:tailEnd/>
+              </a14:hiddenLine>
+            </a:ext>
+            <a:ext uri="{AF507438-7753-43E0-B8FC-AC1667EBCBE1}">
+              <a14:hiddenEffects xmlns:a14="http://schemas.microsoft.com/office/drawing/2010/main">
+                <a:effectLst>
+                  <a:outerShdw dist="35921" dir="2700000" algn="ctr" rotWithShape="0">
+                    <a:schemeClr val="bg2"/>
+                  </a:outerShdw>
+                </a:effectLst>
+              </a14:hiddenEffects>
+            </a:ext>
+          </a:extLst>
+        </p:spPr>
+        <p:txBody>
+          <a:bodyPr vert="horz" wrap="none" lIns="91440" tIns="45720" rIns="91440" bIns="45720" numCol="1" anchor="ctr" anchorCtr="0" compatLnSpc="1">
+            <a:prstTxWarp prst="textNoShape">
+              <a:avLst/>
+            </a:prstTxWarp>
+            <a:spAutoFit/>
+          </a:bodyPr>
+          <a:lstStyle/>
+          <a:p>
+            <a:endParaRPr lang="en-US"/>
+          </a:p>
+        </p:txBody>
+      </p:sp>
+      <p:graphicFrame>
+        <p:nvGraphicFramePr>
+          <p:cNvPr id="8" name="Object 7"/>
+          <p:cNvGraphicFramePr>
+            <a:graphicFrameLocks noChangeAspect="1"/>
+          </p:cNvGraphicFramePr>
+          <p:nvPr>
+            <p:extLst>
+              <p:ext uri="{D42A27DB-BD31-4B8C-83A1-F6EECF244321}">
+                <p14:modId xmlns:p14="http://schemas.microsoft.com/office/powerpoint/2010/main" val="2576207088"/>
+              </p:ext>
+            </p:extLst>
+          </p:nvPr>
+        </p:nvGraphicFramePr>
+        <p:xfrm>
+          <a:off x="1981200" y="3505200"/>
+          <a:ext cx="4839419" cy="1371600"/>
+        </p:xfrm>
+        <a:graphic>
+          <a:graphicData uri="http://schemas.openxmlformats.org/presentationml/2006/ole">
+            <mc:AlternateContent xmlns:mc="http://schemas.openxmlformats.org/markup-compatibility/2006">
+              <mc:Choice xmlns:v="urn:schemas-microsoft-com:vml" Requires="v">
+                <p:oleObj spid="_x0000_s3076" r:id="rId3" imgW="3572937" imgH="1000644" progId="Visio.Drawing.11">
+                  <p:embed/>
+                </p:oleObj>
+              </mc:Choice>
+              <mc:Fallback>
+                <p:oleObj r:id="rId3" imgW="3572937" imgH="1000644" progId="Visio.Drawing.11">
+                  <p:embed/>
+                  <p:pic>
+                    <p:nvPicPr>
+                      <p:cNvPr id="0" name="Object 1"/>
+                      <p:cNvPicPr>
+                        <a:picLocks noChangeAspect="1" noChangeArrowheads="1"/>
+                      </p:cNvPicPr>
+                      <p:nvPr/>
+                    </p:nvPicPr>
+                    <p:blipFill>
+                      <a:blip r:embed="rId4">
+                        <a:extLst>
+                          <a:ext uri="{28A0092B-C50C-407E-A947-70E740481C1C}">
+                            <a14:useLocalDpi xmlns:a14="http://schemas.microsoft.com/office/drawing/2010/main" val="0"/>
+                          </a:ext>
+                        </a:extLst>
+                      </a:blip>
+                      <a:srcRect/>
+                      <a:stretch>
+                        <a:fillRect/>
+                      </a:stretch>
+                    </p:blipFill>
+                    <p:spPr bwMode="auto">
+                      <a:xfrm>
+                        <a:off x="1981200" y="3505200"/>
+                        <a:ext cx="4839419" cy="1371600"/>
+                      </a:xfrm>
+                      <a:prstGeom prst="rect">
+                        <a:avLst/>
+                      </a:prstGeom>
+                      <a:noFill/>
+                    </p:spPr>
+                  </p:pic>
+                </p:oleObj>
+              </mc:Fallback>
+            </mc:AlternateContent>
+          </a:graphicData>
+        </a:graphic>
+      </p:graphicFrame>
+    </p:spTree>
+    <p:extLst>
+      <p:ext uri="{BB962C8B-B14F-4D97-AF65-F5344CB8AC3E}">
+        <p14:creationId xmlns:p14="http://schemas.microsoft.com/office/powerpoint/2010/main" val="3902519713"/>
+      </p:ext>
+    </p:extLst>
+  </p:cSld>
+  <p:clrMapOvr>
+    <a:masterClrMapping/>
+  </p:clrMapOvr>
+</p:sld>
+</file>
+
+<file path=ppt/slides/slide13.xml><?xml version="1.0" encoding="utf-8"?>
+<p:sld xmlns:a="http://schemas.openxmlformats.org/drawingml/2006/main" xmlns:r="http://schemas.openxmlformats.org/officeDocument/2006/relationships" xmlns:p="http://schemas.openxmlformats.org/presentationml/2006/main">
+  <p:cSld>
+    <p:spTree>
+      <p:nvGrpSpPr>
+        <p:cNvPr id="1" name=""/>
+        <p:cNvGrpSpPr/>
+        <p:nvPr/>
+      </p:nvGrpSpPr>
+      <p:grpSpPr>
+        <a:xfrm>
+          <a:off x="0" y="0"/>
+          <a:ext cx="0" cy="0"/>
+          <a:chOff x="0" y="0"/>
+          <a:chExt cx="0" cy="0"/>
+        </a:xfrm>
+      </p:grpSpPr>
+      <p:sp>
+        <p:nvSpPr>
+          <p:cNvPr id="2" name="Title 1"/>
+          <p:cNvSpPr>
+            <a:spLocks noGrp="1"/>
+          </p:cNvSpPr>
+          <p:nvPr>
+            <p:ph type="title"/>
+          </p:nvPr>
+        </p:nvSpPr>
+        <p:spPr/>
+        <p:txBody>
+          <a:bodyPr/>
+          <a:lstStyle/>
+          <a:p>
+            <a:r>
+              <a:rPr lang="en-US" smtClean="0"/>
+              <a:t>Mô hình triển khai</a:t>
+            </a:r>
+            <a:endParaRPr lang="en-US"/>
+          </a:p>
+        </p:txBody>
+      </p:sp>
+      <p:sp>
+        <p:nvSpPr>
+          <p:cNvPr id="3" name="Content Placeholder 2"/>
+          <p:cNvSpPr>
+            <a:spLocks noGrp="1"/>
+          </p:cNvSpPr>
+          <p:nvPr>
+            <p:ph idx="1"/>
+          </p:nvPr>
+        </p:nvSpPr>
+        <p:spPr/>
+        <p:txBody>
+          <a:bodyPr/>
+          <a:lstStyle/>
+          <a:p>
+            <a:endParaRPr lang="en-US"/>
+          </a:p>
+        </p:txBody>
+      </p:sp>
+      <p:sp>
+        <p:nvSpPr>
+          <p:cNvPr id="4" name="Rectangle 2"/>
+          <p:cNvSpPr>
+            <a:spLocks noChangeArrowheads="1"/>
+          </p:cNvSpPr>
+          <p:nvPr/>
+        </p:nvSpPr>
+        <p:spPr bwMode="auto">
+          <a:xfrm>
+            <a:off x="0" y="0"/>
+            <a:ext cx="9144000" cy="0"/>
+          </a:xfrm>
+          <a:prstGeom prst="rect">
+            <a:avLst/>
+          </a:prstGeom>
+          <a:noFill/>
+          <a:ln>
+            <a:noFill/>
+          </a:ln>
+          <a:effectLst/>
+          <a:extLst>
+            <a:ext uri="{909E8E84-426E-40DD-AFC4-6F175D3DCCD1}">
+              <a14:hiddenFill xmlns:a14="http://schemas.microsoft.com/office/drawing/2010/main">
+                <a:solidFill>
+                  <a:schemeClr val="accent1"/>
+                </a:solidFill>
+              </a14:hiddenFill>
+            </a:ext>
+            <a:ext uri="{91240B29-F687-4F45-9708-019B960494DF}">
+              <a14:hiddenLine xmlns:a14="http://schemas.microsoft.com/office/drawing/2010/main" w="9525">
+                <a:solidFill>
+                  <a:schemeClr val="tx1"/>
+                </a:solidFill>
+                <a:miter lim="800000"/>
+                <a:headEnd/>
+                <a:tailEnd/>
+              </a14:hiddenLine>
+            </a:ext>
+            <a:ext uri="{AF507438-7753-43E0-B8FC-AC1667EBCBE1}">
+              <a14:hiddenEffects xmlns:a14="http://schemas.microsoft.com/office/drawing/2010/main">
+                <a:effectLst>
+                  <a:outerShdw dist="35921" dir="2700000" algn="ctr" rotWithShape="0">
+                    <a:schemeClr val="bg2"/>
+                  </a:outerShdw>
+                </a:effectLst>
+              </a14:hiddenEffects>
+            </a:ext>
+          </a:extLst>
+        </p:spPr>
+        <p:txBody>
+          <a:bodyPr vert="horz" wrap="none" lIns="91440" tIns="45720" rIns="91440" bIns="45720" numCol="1" anchor="ctr" anchorCtr="0" compatLnSpc="1">
+            <a:prstTxWarp prst="textNoShape">
+              <a:avLst/>
+            </a:prstTxWarp>
+            <a:spAutoFit/>
+          </a:bodyPr>
+          <a:lstStyle/>
+          <a:p>
+            <a:endParaRPr lang="en-US"/>
+          </a:p>
+        </p:txBody>
+      </p:sp>
+      <p:graphicFrame>
+        <p:nvGraphicFramePr>
+          <p:cNvPr id="5" name="Object 4"/>
+          <p:cNvGraphicFramePr>
+            <a:graphicFrameLocks noChangeAspect="1"/>
+          </p:cNvGraphicFramePr>
+          <p:nvPr>
+            <p:extLst>
+              <p:ext uri="{D42A27DB-BD31-4B8C-83A1-F6EECF244321}">
+                <p14:modId xmlns:p14="http://schemas.microsoft.com/office/powerpoint/2010/main" val="355433063"/>
+              </p:ext>
+            </p:extLst>
+          </p:nvPr>
+        </p:nvGraphicFramePr>
+        <p:xfrm>
+          <a:off x="1371600" y="2971800"/>
+          <a:ext cx="5791200" cy="2305050"/>
+        </p:xfrm>
+        <a:graphic>
+          <a:graphicData uri="http://schemas.openxmlformats.org/presentationml/2006/ole">
+            <mc:AlternateContent xmlns:mc="http://schemas.openxmlformats.org/markup-compatibility/2006">
+              <mc:Choice xmlns:v="urn:schemas-microsoft-com:vml" Requires="v">
+                <p:oleObj spid="_x0000_s1028" r:id="rId3" imgW="6688055" imgH="2661113" progId="Visio.Drawing.11">
+                  <p:embed/>
+                </p:oleObj>
+              </mc:Choice>
+              <mc:Fallback>
+                <p:oleObj r:id="rId3" imgW="6688055" imgH="2661113" progId="Visio.Drawing.11">
+                  <p:embed/>
+                  <p:pic>
+                    <p:nvPicPr>
+                      <p:cNvPr id="0" name="Object 1"/>
+                      <p:cNvPicPr>
+                        <a:picLocks noChangeAspect="1" noChangeArrowheads="1"/>
+                      </p:cNvPicPr>
+                      <p:nvPr/>
+                    </p:nvPicPr>
+                    <p:blipFill>
+                      <a:blip r:embed="rId4">
+                        <a:extLst>
+                          <a:ext uri="{28A0092B-C50C-407E-A947-70E740481C1C}">
+                            <a14:useLocalDpi xmlns:a14="http://schemas.microsoft.com/office/drawing/2010/main" val="0"/>
+                          </a:ext>
+                        </a:extLst>
+                      </a:blip>
+                      <a:srcRect/>
+                      <a:stretch>
+                        <a:fillRect/>
+                      </a:stretch>
+                    </p:blipFill>
+                    <p:spPr bwMode="auto">
+                      <a:xfrm>
+                        <a:off x="1371600" y="2971800"/>
+                        <a:ext cx="5791200" cy="2305050"/>
+                      </a:xfrm>
+                      <a:prstGeom prst="rect">
+                        <a:avLst/>
+                      </a:prstGeom>
+                      <a:noFill/>
+                      <a:extLst>
+                        <a:ext uri="{909E8E84-426E-40DD-AFC4-6F175D3DCCD1}">
+                          <a14:hiddenFill xmlns:a14="http://schemas.microsoft.com/office/drawing/2010/main">
+                            <a:solidFill>
+                              <a:srgbClr val="FFFFFF"/>
+                            </a:solidFill>
+                          </a14:hiddenFill>
+                        </a:ext>
+                      </a:extLst>
+                    </p:spPr>
+                  </p:pic>
+                </p:oleObj>
+              </mc:Fallback>
+            </mc:AlternateContent>
+          </a:graphicData>
+        </a:graphic>
+      </p:graphicFrame>
+    </p:spTree>
+    <p:extLst>
+      <p:ext uri="{BB962C8B-B14F-4D97-AF65-F5344CB8AC3E}">
+        <p14:creationId xmlns:p14="http://schemas.microsoft.com/office/powerpoint/2010/main" val="1908319741"/>
+      </p:ext>
+    </p:extLst>
+  </p:cSld>
+  <p:clrMapOvr>
+    <a:masterClrMapping/>
+  </p:clrMapOvr>
+</p:sld>
+</file>
+
+<file path=ppt/slides/slide14.xml><?xml version="1.0" encoding="utf-8"?>
+<p:sld xmlns:a="http://schemas.openxmlformats.org/drawingml/2006/main" xmlns:r="http://schemas.openxmlformats.org/officeDocument/2006/relationships" xmlns:p="http://schemas.openxmlformats.org/presentationml/2006/main">
+  <p:cSld>
+    <p:spTree>
+      <p:nvGrpSpPr>
+        <p:cNvPr id="1" name=""/>
+        <p:cNvGrpSpPr/>
+        <p:nvPr/>
+      </p:nvGrpSpPr>
+      <p:grpSpPr>
+        <a:xfrm>
+          <a:off x="0" y="0"/>
+          <a:ext cx="0" cy="0"/>
+          <a:chOff x="0" y="0"/>
+          <a:chExt cx="0" cy="0"/>
+        </a:xfrm>
+      </p:grpSpPr>
+      <p:sp>
+        <p:nvSpPr>
+          <p:cNvPr id="2" name="Title 1"/>
+          <p:cNvSpPr>
+            <a:spLocks noGrp="1"/>
+          </p:cNvSpPr>
+          <p:nvPr>
+            <p:ph type="title"/>
+          </p:nvPr>
+        </p:nvSpPr>
+        <p:spPr/>
+        <p:txBody>
+          <a:bodyPr/>
+          <a:lstStyle/>
+          <a:p>
+            <a:r>
+              <a:rPr lang="en-US" smtClean="0"/>
+              <a:t>Cơ chế bảo mật (1/2)</a:t>
+            </a:r>
+            <a:endParaRPr lang="en-US"/>
+          </a:p>
+        </p:txBody>
+      </p:sp>
+      <p:sp>
+        <p:nvSpPr>
+          <p:cNvPr id="3" name="Content Placeholder 2"/>
+          <p:cNvSpPr>
+            <a:spLocks noGrp="1"/>
+          </p:cNvSpPr>
+          <p:nvPr>
+            <p:ph idx="1"/>
+          </p:nvPr>
+        </p:nvSpPr>
+        <p:spPr/>
+        <p:txBody>
+          <a:bodyPr/>
+          <a:lstStyle/>
+          <a:p>
+            <a:r>
+              <a:rPr lang="en-US"/>
+              <a:t>Hệ thống được bảo mật thông qua cơ chế kiểm soát truy cập dựa trên vai </a:t>
+            </a:r>
+            <a:r>
+              <a:rPr lang="en-US"/>
+              <a:t>trò </a:t>
+            </a:r>
+            <a:r>
+              <a:rPr lang="en-US"/>
+              <a:t>(role based access </a:t>
+            </a:r>
+            <a:r>
+              <a:rPr lang="en-US"/>
+              <a:t>control</a:t>
+            </a:r>
+            <a:r>
+              <a:rPr lang="en-US" smtClean="0"/>
+              <a:t>)</a:t>
+            </a:r>
+          </a:p>
+          <a:p>
+            <a:r>
+              <a:rPr lang="en-US"/>
+              <a:t>Quyền của người dùng trong hệ thống có dạng “domain : </a:t>
+            </a:r>
+            <a:r>
+              <a:rPr lang="en-US"/>
+              <a:t>operation</a:t>
+            </a:r>
+            <a:r>
+              <a:rPr lang="en-US" smtClean="0"/>
+              <a:t>”.</a:t>
+            </a:r>
+          </a:p>
+          <a:p>
+            <a:pPr lvl="1"/>
+            <a:r>
+              <a:rPr lang="en-US"/>
+              <a:t>“project : </a:t>
+            </a:r>
+            <a:r>
+              <a:rPr lang="en-US"/>
+              <a:t>read</a:t>
+            </a:r>
+            <a:r>
+              <a:rPr lang="en-US" smtClean="0"/>
+              <a:t>”</a:t>
+            </a:r>
+          </a:p>
+          <a:p>
+            <a:pPr lvl="1"/>
+            <a:r>
+              <a:rPr lang="en-US"/>
+              <a:t>“project : list” </a:t>
+            </a:r>
+            <a:endParaRPr lang="en-US" smtClean="0"/>
+          </a:p>
+          <a:p>
+            <a:pPr lvl="1"/>
+            <a:endParaRPr lang="en-US" smtClean="0"/>
+          </a:p>
+        </p:txBody>
+      </p:sp>
+    </p:spTree>
+    <p:extLst>
+      <p:ext uri="{BB962C8B-B14F-4D97-AF65-F5344CB8AC3E}">
+        <p14:creationId xmlns:p14="http://schemas.microsoft.com/office/powerpoint/2010/main" val="2530961885"/>
+      </p:ext>
+    </p:extLst>
+  </p:cSld>
+  <p:clrMapOvr>
+    <a:masterClrMapping/>
+  </p:clrMapOvr>
+</p:sld>
+</file>
+
+<file path=ppt/slides/slide15.xml><?xml version="1.0" encoding="utf-8"?>
+<p:sld xmlns:a="http://schemas.openxmlformats.org/drawingml/2006/main" xmlns:r="http://schemas.openxmlformats.org/officeDocument/2006/relationships" xmlns:p="http://schemas.openxmlformats.org/presentationml/2006/main">
+  <p:cSld>
+    <p:spTree>
+      <p:nvGrpSpPr>
+        <p:cNvPr id="1" name=""/>
+        <p:cNvGrpSpPr/>
+        <p:nvPr/>
+      </p:nvGrpSpPr>
+      <p:grpSpPr>
+        <a:xfrm>
+          <a:off x="0" y="0"/>
+          <a:ext cx="0" cy="0"/>
+          <a:chOff x="0" y="0"/>
+          <a:chExt cx="0" cy="0"/>
+        </a:xfrm>
+      </p:grpSpPr>
+      <p:sp>
+        <p:nvSpPr>
+          <p:cNvPr id="2" name="Title 1"/>
+          <p:cNvSpPr>
+            <a:spLocks noGrp="1"/>
+          </p:cNvSpPr>
+          <p:nvPr>
+            <p:ph type="title"/>
+          </p:nvPr>
+        </p:nvSpPr>
+        <p:spPr/>
+        <p:txBody>
+          <a:bodyPr/>
+          <a:lstStyle/>
+          <a:p>
+            <a:r>
+              <a:rPr lang="en-US" smtClean="0"/>
+              <a:t>Cơ chế bảo mật (1/2)</a:t>
+            </a:r>
+            <a:endParaRPr lang="en-US"/>
+          </a:p>
+        </p:txBody>
+      </p:sp>
+      <p:sp>
+        <p:nvSpPr>
+          <p:cNvPr id="3" name="Content Placeholder 2"/>
+          <p:cNvSpPr>
+            <a:spLocks noGrp="1"/>
+          </p:cNvSpPr>
+          <p:nvPr>
+            <p:ph idx="1"/>
+          </p:nvPr>
+        </p:nvSpPr>
+        <p:spPr/>
+        <p:txBody>
+          <a:bodyPr/>
+          <a:lstStyle/>
+          <a:p>
+            <a:pPr lvl="1"/>
+            <a:endParaRPr lang="en-US" smtClean="0"/>
+          </a:p>
+        </p:txBody>
+      </p:sp>
+      <p:sp>
+        <p:nvSpPr>
+          <p:cNvPr id="4" name="Rectangle 2"/>
+          <p:cNvSpPr>
+            <a:spLocks noChangeArrowheads="1"/>
+          </p:cNvSpPr>
+          <p:nvPr/>
+        </p:nvSpPr>
+        <p:spPr bwMode="auto">
+          <a:xfrm>
+            <a:off x="0" y="0"/>
+            <a:ext cx="9144000" cy="0"/>
+          </a:xfrm>
+          <a:prstGeom prst="rect">
+            <a:avLst/>
+          </a:prstGeom>
+          <a:noFill/>
+          <a:ln>
+            <a:noFill/>
+          </a:ln>
+          <a:effectLst/>
+          <a:extLst>
+            <a:ext uri="{909E8E84-426E-40DD-AFC4-6F175D3DCCD1}">
+              <a14:hiddenFill xmlns:a14="http://schemas.microsoft.com/office/drawing/2010/main">
+                <a:solidFill>
+                  <a:schemeClr val="accent1"/>
+                </a:solidFill>
+              </a14:hiddenFill>
+            </a:ext>
+            <a:ext uri="{91240B29-F687-4F45-9708-019B960494DF}">
+              <a14:hiddenLine xmlns:a14="http://schemas.microsoft.com/office/drawing/2010/main" w="9525">
+                <a:solidFill>
+                  <a:schemeClr val="tx1"/>
+                </a:solidFill>
+                <a:miter lim="800000"/>
+                <a:headEnd/>
+                <a:tailEnd/>
+              </a14:hiddenLine>
+            </a:ext>
+            <a:ext uri="{AF507438-7753-43E0-B8FC-AC1667EBCBE1}">
+              <a14:hiddenEffects xmlns:a14="http://schemas.microsoft.com/office/drawing/2010/main">
+                <a:effectLst>
+                  <a:outerShdw dist="35921" dir="2700000" algn="ctr" rotWithShape="0">
+                    <a:schemeClr val="bg2"/>
+                  </a:outerShdw>
+                </a:effectLst>
+              </a14:hiddenEffects>
+            </a:ext>
+          </a:extLst>
+        </p:spPr>
+        <p:txBody>
+          <a:bodyPr vert="horz" wrap="none" lIns="91440" tIns="45720" rIns="91440" bIns="45720" numCol="1" anchor="ctr" anchorCtr="0" compatLnSpc="1">
+            <a:prstTxWarp prst="textNoShape">
+              <a:avLst/>
+            </a:prstTxWarp>
+            <a:spAutoFit/>
+          </a:bodyPr>
+          <a:lstStyle/>
+          <a:p>
+            <a:endParaRPr lang="en-US"/>
+          </a:p>
+        </p:txBody>
+      </p:sp>
+      <p:graphicFrame>
+        <p:nvGraphicFramePr>
+          <p:cNvPr id="5" name="Object 4"/>
+          <p:cNvGraphicFramePr>
+            <a:graphicFrameLocks noChangeAspect="1"/>
+          </p:cNvGraphicFramePr>
+          <p:nvPr>
+            <p:extLst>
+              <p:ext uri="{D42A27DB-BD31-4B8C-83A1-F6EECF244321}">
+                <p14:modId xmlns:p14="http://schemas.microsoft.com/office/powerpoint/2010/main" val="1258680104"/>
+              </p:ext>
+            </p:extLst>
+          </p:nvPr>
+        </p:nvGraphicFramePr>
+        <p:xfrm>
+          <a:off x="1142999" y="2667000"/>
+          <a:ext cx="6663117" cy="3124200"/>
+        </p:xfrm>
+        <a:graphic>
+          <a:graphicData uri="http://schemas.openxmlformats.org/presentationml/2006/ole">
+            <mc:AlternateContent xmlns:mc="http://schemas.openxmlformats.org/markup-compatibility/2006">
+              <mc:Choice xmlns:v="urn:schemas-microsoft-com:vml" Requires="v">
+                <p:oleObj spid="_x0000_s4100" r:id="rId3" imgW="4586835" imgH="2157957" progId="Visio.Drawing.11">
+                  <p:embed/>
+                </p:oleObj>
+              </mc:Choice>
+              <mc:Fallback>
+                <p:oleObj r:id="rId3" imgW="4586835" imgH="2157957" progId="Visio.Drawing.11">
+                  <p:embed/>
+                  <p:pic>
+                    <p:nvPicPr>
+                      <p:cNvPr id="0" name="Object 1"/>
+                      <p:cNvPicPr>
+                        <a:picLocks noChangeAspect="1" noChangeArrowheads="1"/>
+                      </p:cNvPicPr>
+                      <p:nvPr/>
+                    </p:nvPicPr>
+                    <p:blipFill>
+                      <a:blip r:embed="rId4">
+                        <a:extLst>
+                          <a:ext uri="{28A0092B-C50C-407E-A947-70E740481C1C}">
+                            <a14:useLocalDpi xmlns:a14="http://schemas.microsoft.com/office/drawing/2010/main" val="0"/>
+                          </a:ext>
+                        </a:extLst>
+                      </a:blip>
+                      <a:srcRect/>
+                      <a:stretch>
+                        <a:fillRect/>
+                      </a:stretch>
+                    </p:blipFill>
+                    <p:spPr bwMode="auto">
+                      <a:xfrm>
+                        <a:off x="1142999" y="2667000"/>
+                        <a:ext cx="6663117" cy="3124200"/>
+                      </a:xfrm>
+                      <a:prstGeom prst="rect">
+                        <a:avLst/>
+                      </a:prstGeom>
+                      <a:noFill/>
+                    </p:spPr>
+                  </p:pic>
+                </p:oleObj>
+              </mc:Fallback>
+            </mc:AlternateContent>
+          </a:graphicData>
+        </a:graphic>
+      </p:graphicFrame>
+    </p:spTree>
+    <p:extLst>
+      <p:ext uri="{BB962C8B-B14F-4D97-AF65-F5344CB8AC3E}">
+        <p14:creationId xmlns:p14="http://schemas.microsoft.com/office/powerpoint/2010/main" val="2515755840"/>
+      </p:ext>
+    </p:extLst>
+  </p:cSld>
+  <p:clrMapOvr>
+    <a:masterClrMapping/>
+  </p:clrMapOvr>
+</p:sld>
+</file>
+
+<file path=ppt/slides/slide16.xml><?xml version="1.0" encoding="utf-8"?>
+<p:sld xmlns:a="http://schemas.openxmlformats.org/drawingml/2006/main" xmlns:r="http://schemas.openxmlformats.org/officeDocument/2006/relationships" xmlns:p="http://schemas.openxmlformats.org/presentationml/2006/main">
+  <p:cSld>
+    <p:spTree>
+      <p:nvGrpSpPr>
+        <p:cNvPr id="1" name=""/>
+        <p:cNvGrpSpPr/>
+        <p:nvPr/>
+      </p:nvGrpSpPr>
+      <p:grpSpPr>
+        <a:xfrm>
+          <a:off x="0" y="0"/>
+          <a:ext cx="0" cy="0"/>
+          <a:chOff x="0" y="0"/>
+          <a:chExt cx="0" cy="0"/>
+        </a:xfrm>
+      </p:grpSpPr>
+      <p:sp>
+        <p:nvSpPr>
+          <p:cNvPr id="2" name="Title 1"/>
+          <p:cNvSpPr>
+            <a:spLocks noGrp="1"/>
+          </p:cNvSpPr>
+          <p:nvPr>
+            <p:ph type="title"/>
+          </p:nvPr>
+        </p:nvSpPr>
+        <p:spPr/>
+        <p:txBody>
+          <a:bodyPr/>
+          <a:lstStyle/>
+          <a:p>
+            <a:r>
+              <a:rPr lang="en-US" smtClean="0"/>
+              <a:t>Thiết kế giao diện (1/4)</a:t>
+            </a:r>
+            <a:endParaRPr lang="en-US"/>
+          </a:p>
+        </p:txBody>
+      </p:sp>
+      <p:sp>
+        <p:nvSpPr>
+          <p:cNvPr id="3" name="Content Placeholder 2"/>
+          <p:cNvSpPr>
+            <a:spLocks noGrp="1"/>
+          </p:cNvSpPr>
+          <p:nvPr>
+            <p:ph idx="1"/>
+          </p:nvPr>
+        </p:nvSpPr>
+        <p:spPr/>
+        <p:txBody>
+          <a:bodyPr/>
+          <a:lstStyle/>
+          <a:p>
+            <a:endParaRPr lang="en-US"/>
+          </a:p>
+        </p:txBody>
+      </p:sp>
+      <p:pic>
+        <p:nvPicPr>
+          <p:cNvPr id="4" name="Picture 3"/>
+          <p:cNvPicPr/>
+          <p:nvPr/>
+        </p:nvPicPr>
+        <p:blipFill rotWithShape="1">
+          <a:blip r:embed="rId2">
+            <a:extLst>
+              <a:ext uri="{28A0092B-C50C-407E-A947-70E740481C1C}">
+                <a14:useLocalDpi xmlns:a14="http://schemas.microsoft.com/office/drawing/2010/main" val="0"/>
+              </a:ext>
+            </a:extLst>
+          </a:blip>
+          <a:srcRect r="47051" b="67402"/>
+          <a:stretch/>
+        </p:blipFill>
+        <p:spPr bwMode="auto">
+          <a:xfrm>
+            <a:off x="685800" y="1775012"/>
+            <a:ext cx="7954144" cy="4808855"/>
+          </a:xfrm>
+          <a:prstGeom prst="rect">
+            <a:avLst/>
+          </a:prstGeom>
+          <a:noFill/>
+          <a:ln>
+            <a:noFill/>
+          </a:ln>
+          <a:extLst>
+            <a:ext uri="{53640926-AAD7-44D8-BBD7-CCE9431645EC}">
+              <a14:shadowObscured xmlns:a14="http://schemas.microsoft.com/office/drawing/2010/main"/>
+            </a:ext>
+          </a:extLst>
+        </p:spPr>
+      </p:pic>
+    </p:spTree>
+    <p:extLst>
+      <p:ext uri="{BB962C8B-B14F-4D97-AF65-F5344CB8AC3E}">
+        <p14:creationId xmlns:p14="http://schemas.microsoft.com/office/powerpoint/2010/main" val="3273432780"/>
+      </p:ext>
+    </p:extLst>
+  </p:cSld>
+  <p:clrMapOvr>
+    <a:masterClrMapping/>
+  </p:clrMapOvr>
+</p:sld>
+</file>
+
+<file path=ppt/slides/slide17.xml><?xml version="1.0" encoding="utf-8"?>
+<p:sld xmlns:a="http://schemas.openxmlformats.org/drawingml/2006/main" xmlns:r="http://schemas.openxmlformats.org/officeDocument/2006/relationships" xmlns:p="http://schemas.openxmlformats.org/presentationml/2006/main">
+  <p:cSld>
+    <p:spTree>
+      <p:nvGrpSpPr>
+        <p:cNvPr id="1" name=""/>
+        <p:cNvGrpSpPr/>
+        <p:nvPr/>
+      </p:nvGrpSpPr>
+      <p:grpSpPr>
+        <a:xfrm>
+          <a:off x="0" y="0"/>
+          <a:ext cx="0" cy="0"/>
+          <a:chOff x="0" y="0"/>
+          <a:chExt cx="0" cy="0"/>
+        </a:xfrm>
+      </p:grpSpPr>
+      <p:sp>
+        <p:nvSpPr>
+          <p:cNvPr id="2" name="Title 1"/>
+          <p:cNvSpPr>
+            <a:spLocks noGrp="1"/>
+          </p:cNvSpPr>
+          <p:nvPr>
+            <p:ph type="title"/>
+          </p:nvPr>
+        </p:nvSpPr>
+        <p:spPr/>
+        <p:txBody>
+          <a:bodyPr/>
+          <a:lstStyle/>
+          <a:p>
+            <a:r>
+              <a:rPr lang="en-US"/>
+              <a:t>Thiết kế giao </a:t>
+            </a:r>
+            <a:r>
+              <a:rPr lang="en-US"/>
+              <a:t>diện </a:t>
+            </a:r>
+            <a:r>
+              <a:rPr lang="en-US" smtClean="0"/>
+              <a:t>(2/4)</a:t>
+            </a:r>
+            <a:endParaRPr lang="en-US"/>
+          </a:p>
+        </p:txBody>
+      </p:sp>
+      <p:sp>
+        <p:nvSpPr>
+          <p:cNvPr id="3" name="Content Placeholder 2"/>
+          <p:cNvSpPr>
+            <a:spLocks noGrp="1"/>
+          </p:cNvSpPr>
+          <p:nvPr>
+            <p:ph idx="1"/>
+          </p:nvPr>
+        </p:nvSpPr>
+        <p:spPr/>
+        <p:txBody>
+          <a:bodyPr/>
+          <a:lstStyle/>
+          <a:p>
+            <a:endParaRPr lang="en-US"/>
+          </a:p>
+        </p:txBody>
+      </p:sp>
+      <p:pic>
+        <p:nvPicPr>
+          <p:cNvPr id="4" name="Picture 3"/>
+          <p:cNvPicPr/>
+          <p:nvPr/>
+        </p:nvPicPr>
+        <p:blipFill>
+          <a:blip r:embed="rId2"/>
+          <a:stretch>
+            <a:fillRect/>
+          </a:stretch>
+        </p:blipFill>
+        <p:spPr>
+          <a:xfrm>
+            <a:off x="838200" y="1752600"/>
+            <a:ext cx="7589497" cy="4682173"/>
+          </a:xfrm>
+          <a:prstGeom prst="rect">
+            <a:avLst/>
+          </a:prstGeom>
+        </p:spPr>
+      </p:pic>
+    </p:spTree>
+    <p:extLst>
+      <p:ext uri="{BB962C8B-B14F-4D97-AF65-F5344CB8AC3E}">
+        <p14:creationId xmlns:p14="http://schemas.microsoft.com/office/powerpoint/2010/main" val="1541079705"/>
+      </p:ext>
+    </p:extLst>
+  </p:cSld>
+  <p:clrMapOvr>
+    <a:masterClrMapping/>
+  </p:clrMapOvr>
+</p:sld>
+</file>
+
+<file path=ppt/slides/slide18.xml><?xml version="1.0" encoding="utf-8"?>
+<p:sld xmlns:a="http://schemas.openxmlformats.org/drawingml/2006/main" xmlns:r="http://schemas.openxmlformats.org/officeDocument/2006/relationships" xmlns:p="http://schemas.openxmlformats.org/presentationml/2006/main">
+  <p:cSld>
+    <p:spTree>
+      <p:nvGrpSpPr>
+        <p:cNvPr id="1" name=""/>
+        <p:cNvGrpSpPr/>
+        <p:nvPr/>
+      </p:nvGrpSpPr>
+      <p:grpSpPr>
+        <a:xfrm>
+          <a:off x="0" y="0"/>
+          <a:ext cx="0" cy="0"/>
+          <a:chOff x="0" y="0"/>
+          <a:chExt cx="0" cy="0"/>
+        </a:xfrm>
+      </p:grpSpPr>
+      <p:sp>
+        <p:nvSpPr>
+          <p:cNvPr id="2" name="Title 1"/>
+          <p:cNvSpPr>
+            <a:spLocks noGrp="1"/>
+          </p:cNvSpPr>
+          <p:nvPr>
+            <p:ph type="title"/>
+          </p:nvPr>
+        </p:nvSpPr>
+        <p:spPr/>
+        <p:txBody>
+          <a:bodyPr/>
+          <a:lstStyle/>
+          <a:p>
+            <a:r>
+              <a:rPr lang="en-US"/>
+              <a:t>Thiết kế giao </a:t>
+            </a:r>
+            <a:r>
+              <a:rPr lang="en-US"/>
+              <a:t>diện </a:t>
+            </a:r>
+            <a:r>
+              <a:rPr lang="en-US" smtClean="0"/>
+              <a:t>(3/4)</a:t>
+            </a:r>
+            <a:endParaRPr lang="en-US"/>
+          </a:p>
+        </p:txBody>
+      </p:sp>
+      <p:sp>
+        <p:nvSpPr>
+          <p:cNvPr id="3" name="Content Placeholder 2"/>
+          <p:cNvSpPr>
+            <a:spLocks noGrp="1"/>
+          </p:cNvSpPr>
+          <p:nvPr>
+            <p:ph idx="1"/>
+          </p:nvPr>
+        </p:nvSpPr>
+        <p:spPr/>
+        <p:txBody>
+          <a:bodyPr/>
+          <a:lstStyle/>
+          <a:p>
+            <a:endParaRPr lang="en-US"/>
+          </a:p>
+        </p:txBody>
+      </p:sp>
+      <p:pic>
+        <p:nvPicPr>
+          <p:cNvPr id="5" name="Picture 4"/>
+          <p:cNvPicPr/>
+          <p:nvPr/>
+        </p:nvPicPr>
+        <p:blipFill>
+          <a:blip r:embed="rId2">
+            <a:extLst>
+              <a:ext uri="{28A0092B-C50C-407E-A947-70E740481C1C}">
+                <a14:useLocalDpi xmlns:a14="http://schemas.microsoft.com/office/drawing/2010/main" val="0"/>
+              </a:ext>
+            </a:extLst>
+          </a:blip>
+          <a:srcRect/>
+          <a:stretch>
+            <a:fillRect/>
+          </a:stretch>
+        </p:blipFill>
+        <p:spPr bwMode="auto">
+          <a:xfrm>
+            <a:off x="1371600" y="1505953"/>
+            <a:ext cx="6400800" cy="4990097"/>
+          </a:xfrm>
+          <a:prstGeom prst="rect">
+            <a:avLst/>
+          </a:prstGeom>
+          <a:noFill/>
+          <a:ln>
+            <a:noFill/>
+          </a:ln>
+        </p:spPr>
+      </p:pic>
+    </p:spTree>
+    <p:extLst>
+      <p:ext uri="{BB962C8B-B14F-4D97-AF65-F5344CB8AC3E}">
+        <p14:creationId xmlns:p14="http://schemas.microsoft.com/office/powerpoint/2010/main" val="3113398580"/>
+      </p:ext>
+    </p:extLst>
+  </p:cSld>
+  <p:clrMapOvr>
+    <a:masterClrMapping/>
+  </p:clrMapOvr>
+</p:sld>
+</file>
+
+<file path=ppt/slides/slide19.xml><?xml version="1.0" encoding="utf-8"?>
+<p:sld xmlns:a="http://schemas.openxmlformats.org/drawingml/2006/main" xmlns:r="http://schemas.openxmlformats.org/officeDocument/2006/relationships" xmlns:p="http://schemas.openxmlformats.org/presentationml/2006/main">
+  <p:cSld>
+    <p:spTree>
+      <p:nvGrpSpPr>
+        <p:cNvPr id="1" name=""/>
+        <p:cNvGrpSpPr/>
+        <p:nvPr/>
+      </p:nvGrpSpPr>
+      <p:grpSpPr>
+        <a:xfrm>
+          <a:off x="0" y="0"/>
+          <a:ext cx="0" cy="0"/>
+          <a:chOff x="0" y="0"/>
+          <a:chExt cx="0" cy="0"/>
+        </a:xfrm>
+      </p:grpSpPr>
+      <p:sp>
+        <p:nvSpPr>
+          <p:cNvPr id="2" name="Title 1"/>
+          <p:cNvSpPr>
+            <a:spLocks noGrp="1"/>
+          </p:cNvSpPr>
+          <p:nvPr>
+            <p:ph type="title"/>
+          </p:nvPr>
+        </p:nvSpPr>
+        <p:spPr/>
+        <p:txBody>
+          <a:bodyPr/>
+          <a:lstStyle/>
+          <a:p>
+            <a:r>
+              <a:rPr lang="en-US"/>
+              <a:t>Thiết kế giao </a:t>
+            </a:r>
+            <a:r>
+              <a:rPr lang="en-US"/>
+              <a:t>diện </a:t>
+            </a:r>
+            <a:r>
+              <a:rPr lang="en-US" smtClean="0"/>
+              <a:t>(4/4)</a:t>
+            </a:r>
+            <a:endParaRPr lang="en-US"/>
+          </a:p>
+        </p:txBody>
+      </p:sp>
+      <p:sp>
+        <p:nvSpPr>
+          <p:cNvPr id="3" name="Content Placeholder 2"/>
+          <p:cNvSpPr>
+            <a:spLocks noGrp="1"/>
+          </p:cNvSpPr>
+          <p:nvPr>
+            <p:ph idx="1"/>
+          </p:nvPr>
+        </p:nvSpPr>
+        <p:spPr/>
+        <p:txBody>
+          <a:bodyPr/>
+          <a:lstStyle/>
+          <a:p>
+            <a:endParaRPr lang="en-US"/>
+          </a:p>
+        </p:txBody>
+      </p:sp>
+      <p:pic>
+        <p:nvPicPr>
+          <p:cNvPr id="6" name="Picture 5"/>
+          <p:cNvPicPr/>
+          <p:nvPr/>
+        </p:nvPicPr>
+        <p:blipFill>
+          <a:blip r:embed="rId2"/>
+          <a:stretch>
+            <a:fillRect/>
+          </a:stretch>
+        </p:blipFill>
+        <p:spPr>
+          <a:xfrm>
+            <a:off x="838200" y="1729920"/>
+            <a:ext cx="7543800" cy="4691200"/>
+          </a:xfrm>
+          <a:prstGeom prst="rect">
+            <a:avLst/>
+          </a:prstGeom>
+        </p:spPr>
+      </p:pic>
+    </p:spTree>
+    <p:extLst>
+      <p:ext uri="{BB962C8B-B14F-4D97-AF65-F5344CB8AC3E}">
+        <p14:creationId xmlns:p14="http://schemas.microsoft.com/office/powerpoint/2010/main" val="2846545139"/>
+      </p:ext>
+    </p:extLst>
+  </p:cSld>
+  <p:clrMapOvr>
+    <a:masterClrMapping/>
+  </p:clrMapOvr>
+</p:sld>
+</file>
+
+<file path=ppt/slides/slide2.xml><?xml version="1.0" encoding="utf-8"?>
+<p:sld xmlns:a="http://schemas.openxmlformats.org/drawingml/2006/main" xmlns:r="http://schemas.openxmlformats.org/officeDocument/2006/relationships" xmlns:p="http://schemas.openxmlformats.org/presentationml/2006/main">
+  <p:cSld>
+    <p:spTree>
+      <p:nvGrpSpPr>
+        <p:cNvPr id="1" name=""/>
+        <p:cNvGrpSpPr/>
+        <p:nvPr/>
+      </p:nvGrpSpPr>
+      <p:grpSpPr>
+        <a:xfrm>
+          <a:off x="0" y="0"/>
+          <a:ext cx="0" cy="0"/>
+          <a:chOff x="0" y="0"/>
+          <a:chExt cx="0" cy="0"/>
+        </a:xfrm>
+      </p:grpSpPr>
+      <p:sp>
+        <p:nvSpPr>
+          <p:cNvPr id="2" name="Title 1"/>
+          <p:cNvSpPr>
+            <a:spLocks noGrp="1"/>
+          </p:cNvSpPr>
+          <p:nvPr>
+            <p:ph type="title"/>
+          </p:nvPr>
+        </p:nvSpPr>
+        <p:spPr/>
+        <p:txBody>
+          <a:bodyPr/>
+          <a:lstStyle/>
+          <a:p>
+            <a:r>
+              <a:rPr lang="en-US" smtClean="0"/>
+              <a:t>Nội dung</a:t>
+            </a:r>
+            <a:endParaRPr lang="en-US"/>
+          </a:p>
+        </p:txBody>
+      </p:sp>
+      <p:sp>
+        <p:nvSpPr>
+          <p:cNvPr id="3" name="Content Placeholder 2"/>
+          <p:cNvSpPr>
+            <a:spLocks noGrp="1"/>
+          </p:cNvSpPr>
+          <p:nvPr>
+            <p:ph idx="1"/>
+          </p:nvPr>
+        </p:nvSpPr>
+        <p:spPr/>
+        <p:txBody>
+          <a:bodyPr/>
+          <a:lstStyle/>
+          <a:p>
+            <a:r>
+              <a:rPr lang="en-US" smtClean="0"/>
+              <a:t>Tổng quan đề tài nghiên cứu</a:t>
+            </a:r>
+          </a:p>
+          <a:p>
+            <a:r>
+              <a:rPr lang="en-US" smtClean="0"/>
+              <a:t>Khảo sát hiện trạng</a:t>
+            </a:r>
+          </a:p>
+          <a:p>
+            <a:r>
+              <a:rPr lang="en-US" smtClean="0"/>
+              <a:t>Xây dựng hệ thống quản lý tương tác</a:t>
+            </a:r>
+          </a:p>
+          <a:p>
+            <a:r>
+              <a:rPr lang="en-US" smtClean="0"/>
+              <a:t>Hướng phát triển</a:t>
+            </a:r>
+            <a:endParaRPr lang="en-US"/>
+          </a:p>
+        </p:txBody>
+      </p:sp>
+    </p:spTree>
+    <p:extLst>
+      <p:ext uri="{BB962C8B-B14F-4D97-AF65-F5344CB8AC3E}">
+        <p14:creationId xmlns:p14="http://schemas.microsoft.com/office/powerpoint/2010/main" val="3329876487"/>
+      </p:ext>
+    </p:extLst>
+  </p:cSld>
+  <p:clrMapOvr>
+    <a:masterClrMapping/>
+  </p:clrMapOvr>
+</p:sld>
+</file>
+
+<file path=ppt/slides/slide20.xml><?xml version="1.0" encoding="utf-8"?>
+<p:sld xmlns:a="http://schemas.openxmlformats.org/drawingml/2006/main" xmlns:r="http://schemas.openxmlformats.org/officeDocument/2006/relationships" xmlns:p="http://schemas.openxmlformats.org/presentationml/2006/main">
+  <p:cSld>
+    <p:spTree>
+      <p:nvGrpSpPr>
+        <p:cNvPr id="1" name=""/>
+        <p:cNvGrpSpPr/>
+        <p:nvPr/>
+      </p:nvGrpSpPr>
+      <p:grpSpPr>
+        <a:xfrm>
+          <a:off x="0" y="0"/>
+          <a:ext cx="0" cy="0"/>
+          <a:chOff x="0" y="0"/>
+          <a:chExt cx="0" cy="0"/>
+        </a:xfrm>
+      </p:grpSpPr>
+      <p:sp>
+        <p:nvSpPr>
+          <p:cNvPr id="2" name="Title 1"/>
+          <p:cNvSpPr>
+            <a:spLocks noGrp="1"/>
+          </p:cNvSpPr>
+          <p:nvPr>
+            <p:ph type="title"/>
+          </p:nvPr>
+        </p:nvSpPr>
+        <p:spPr/>
+        <p:txBody>
+          <a:bodyPr/>
+          <a:lstStyle/>
+          <a:p>
+            <a:r>
+              <a:rPr lang="en-US" smtClean="0"/>
+              <a:t>Hướng phát triển</a:t>
+            </a:r>
+            <a:endParaRPr lang="en-US"/>
+          </a:p>
+        </p:txBody>
+      </p:sp>
+      <p:sp>
+        <p:nvSpPr>
+          <p:cNvPr id="3" name="Content Placeholder 2"/>
+          <p:cNvSpPr>
+            <a:spLocks noGrp="1"/>
+          </p:cNvSpPr>
+          <p:nvPr>
+            <p:ph idx="1"/>
+          </p:nvPr>
+        </p:nvSpPr>
+        <p:spPr/>
+        <p:txBody>
+          <a:bodyPr/>
+          <a:lstStyle/>
+          <a:p>
+            <a:r>
+              <a:rPr lang="en-US" smtClean="0"/>
+              <a:t>Tích hợp các </a:t>
+            </a:r>
+            <a:r>
+              <a:rPr lang="en-US"/>
+              <a:t>hệ thống hỗ trợ tương </a:t>
+            </a:r>
+            <a:r>
+              <a:rPr lang="en-US"/>
+              <a:t>tác </a:t>
+            </a:r>
+            <a:r>
+              <a:rPr lang="en-US" smtClean="0"/>
+              <a:t>khác:</a:t>
+            </a:r>
+          </a:p>
+          <a:p>
+            <a:pPr lvl="1"/>
+            <a:r>
+              <a:rPr lang="en-US" smtClean="0"/>
+              <a:t>Facebook</a:t>
+            </a:r>
+            <a:endParaRPr lang="en-US"/>
+          </a:p>
+          <a:p>
+            <a:pPr lvl="1"/>
+            <a:r>
+              <a:rPr lang="en-US" smtClean="0"/>
+              <a:t>Twitter</a:t>
+            </a:r>
+          </a:p>
+          <a:p>
+            <a:pPr lvl="1"/>
+            <a:r>
+              <a:rPr lang="en-US" smtClean="0"/>
+              <a:t>Skype</a:t>
+            </a:r>
+          </a:p>
+          <a:p>
+            <a:pPr lvl="1"/>
+            <a:r>
+              <a:rPr lang="en-US" smtClean="0"/>
+              <a:t>Yahoo</a:t>
+            </a:r>
+            <a:endParaRPr lang="en-US"/>
+          </a:p>
+          <a:p>
+            <a:pPr lvl="1"/>
+            <a:r>
+              <a:rPr lang="en-US" smtClean="0"/>
+              <a:t>Hệ </a:t>
+            </a:r>
+            <a:r>
+              <a:rPr lang="en-US"/>
+              <a:t>thống quản lý cấu hình phần mềm.</a:t>
+            </a:r>
+          </a:p>
+          <a:p>
+            <a:endParaRPr lang="en-US"/>
+          </a:p>
+        </p:txBody>
+      </p:sp>
+    </p:spTree>
+    <p:extLst>
+      <p:ext uri="{BB962C8B-B14F-4D97-AF65-F5344CB8AC3E}">
+        <p14:creationId xmlns:p14="http://schemas.microsoft.com/office/powerpoint/2010/main" val="4024402129"/>
+      </p:ext>
+    </p:extLst>
+  </p:cSld>
+  <p:clrMapOvr>
+    <a:masterClrMapping/>
+  </p:clrMapOvr>
+</p:sld>
+</file>
+
+<file path=ppt/slides/slide21.xml><?xml version="1.0" encoding="utf-8"?>
+<p:sld xmlns:a="http://schemas.openxmlformats.org/drawingml/2006/main" xmlns:r="http://schemas.openxmlformats.org/officeDocument/2006/relationships" xmlns:p="http://schemas.openxmlformats.org/presentationml/2006/main">
+  <p:cSld>
+    <p:spTree>
+      <p:nvGrpSpPr>
+        <p:cNvPr id="1" name=""/>
+        <p:cNvGrpSpPr/>
+        <p:nvPr/>
+      </p:nvGrpSpPr>
+      <p:grpSpPr>
+        <a:xfrm>
+          <a:off x="0" y="0"/>
+          <a:ext cx="0" cy="0"/>
+          <a:chOff x="0" y="0"/>
+          <a:chExt cx="0" cy="0"/>
+        </a:xfrm>
+      </p:grpSpPr>
+      <p:sp>
+        <p:nvSpPr>
+          <p:cNvPr id="2" name="Title 1"/>
+          <p:cNvSpPr>
+            <a:spLocks noGrp="1"/>
+          </p:cNvSpPr>
+          <p:nvPr>
+            <p:ph type="title"/>
+          </p:nvPr>
+        </p:nvSpPr>
+        <p:spPr/>
+        <p:txBody>
+          <a:bodyPr/>
+          <a:lstStyle/>
+          <a:p>
+            <a:endParaRPr lang="en-US"/>
+          </a:p>
+        </p:txBody>
+      </p:sp>
+      <p:pic>
+        <p:nvPicPr>
+          <p:cNvPr id="2050" name="Picture 2" descr="C:\Users\hyga\Desktop\picture\images (1).jpg"/>
+          <p:cNvPicPr>
+            <a:picLocks noGrp="1" noChangeAspect="1" noChangeArrowheads="1"/>
+          </p:cNvPicPr>
+          <p:nvPr>
+            <p:ph idx="1"/>
+          </p:nvPr>
+        </p:nvPicPr>
+        <p:blipFill>
+          <a:blip r:embed="rId2">
+            <a:extLst>
+              <a:ext uri="{28A0092B-C50C-407E-A947-70E740481C1C}">
+                <a14:useLocalDpi xmlns:a14="http://schemas.microsoft.com/office/drawing/2010/main" val="0"/>
+              </a:ext>
+            </a:extLst>
+          </a:blip>
+          <a:srcRect/>
+          <a:stretch>
+            <a:fillRect/>
+          </a:stretch>
+        </p:blipFill>
+        <p:spPr bwMode="auto">
+          <a:xfrm>
+            <a:off x="2971800" y="2057400"/>
+            <a:ext cx="3728142" cy="3711575"/>
+          </a:xfrm>
+          <a:prstGeom prst="rect">
+            <a:avLst/>
+          </a:prstGeom>
+          <a:noFill/>
+          <a:extLst>
+            <a:ext uri="{909E8E84-426E-40DD-AFC4-6F175D3DCCD1}">
+              <a14:hiddenFill xmlns:a14="http://schemas.microsoft.com/office/drawing/2010/main">
+                <a:solidFill>
+                  <a:srgbClr val="FFFFFF"/>
+                </a:solidFill>
+              </a14:hiddenFill>
+            </a:ext>
+          </a:extLst>
+        </p:spPr>
+      </p:pic>
+    </p:spTree>
+    <p:extLst>
+      <p:ext uri="{BB962C8B-B14F-4D97-AF65-F5344CB8AC3E}">
+        <p14:creationId xmlns:p14="http://schemas.microsoft.com/office/powerpoint/2010/main" val="432506298"/>
+      </p:ext>
+    </p:extLst>
+  </p:cSld>
+  <p:clrMapOvr>
+    <a:masterClrMapping/>
+  </p:clrMapOvr>
+  <p:timing>
+    <p:tnLst>
+      <p:par>
+        <p:cTn id="1" dur="indefinite" restart="never" nodeType="tmRoot"/>
+      </p:par>
+    </p:tnLst>
+  </p:timing>
+</p:sld>
+</file>
+
+<file path=ppt/slides/slide22.xml><?xml version="1.0" encoding="utf-8"?>
+<p:sld xmlns:a="http://schemas.openxmlformats.org/drawingml/2006/main" xmlns:r="http://schemas.openxmlformats.org/officeDocument/2006/relationships" xmlns:p="http://schemas.openxmlformats.org/presentationml/2006/main">
+  <p:cSld>
+    <p:spTree>
+      <p:nvGrpSpPr>
+        <p:cNvPr id="1" name=""/>
+        <p:cNvGrpSpPr/>
+        <p:nvPr/>
+      </p:nvGrpSpPr>
+      <p:grpSpPr>
+        <a:xfrm>
+          <a:off x="0" y="0"/>
+          <a:ext cx="0" cy="0"/>
+          <a:chOff x="0" y="0"/>
+          <a:chExt cx="0" cy="0"/>
+        </a:xfrm>
+      </p:grpSpPr>
+      <p:sp>
+        <p:nvSpPr>
           <p:cNvPr id="4" name="Slide Number Placeholder 3"/>
           <p:cNvSpPr>
             <a:spLocks noGrp="1"/>
@@ -4508,7 +6400,7 @@
             <a:fld id="{65B613A6-ECE8-4332-8450-A606DEF9DB12}" type="slidenum">
               <a:rPr lang="en-US" smtClean="0"/>
               <a:pPr/>
-              <a:t>10</a:t>
+              <a:t>22</a:t>
             </a:fld>
             <a:endParaRPr lang="en-US"/>
           </a:p>
@@ -4575,100 +6467,6 @@
 </p:sld>
 </file>
 
-<file path=ppt/slides/slide2.xml><?xml version="1.0" encoding="utf-8"?>
-<p:sld xmlns:a="http://schemas.openxmlformats.org/drawingml/2006/main" xmlns:r="http://schemas.openxmlformats.org/officeDocument/2006/relationships" xmlns:p="http://schemas.openxmlformats.org/presentationml/2006/main">
-  <p:cSld>
-    <p:spTree>
-      <p:nvGrpSpPr>
-        <p:cNvPr id="1" name=""/>
-        <p:cNvGrpSpPr/>
-        <p:nvPr/>
-      </p:nvGrpSpPr>
-      <p:grpSpPr>
-        <a:xfrm>
-          <a:off x="0" y="0"/>
-          <a:ext cx="0" cy="0"/>
-          <a:chOff x="0" y="0"/>
-          <a:chExt cx="0" cy="0"/>
-        </a:xfrm>
-      </p:grpSpPr>
-      <p:sp>
-        <p:nvSpPr>
-          <p:cNvPr id="2" name="Title 1"/>
-          <p:cNvSpPr>
-            <a:spLocks noGrp="1"/>
-          </p:cNvSpPr>
-          <p:nvPr>
-            <p:ph type="title"/>
-          </p:nvPr>
-        </p:nvSpPr>
-        <p:spPr/>
-        <p:txBody>
-          <a:bodyPr/>
-          <a:lstStyle/>
-          <a:p>
-            <a:r>
-              <a:rPr lang="en-US" smtClean="0"/>
-              <a:t>Nội dung</a:t>
-            </a:r>
-            <a:endParaRPr lang="en-US"/>
-          </a:p>
-        </p:txBody>
-      </p:sp>
-      <p:sp>
-        <p:nvSpPr>
-          <p:cNvPr id="3" name="Content Placeholder 2"/>
-          <p:cNvSpPr>
-            <a:spLocks noGrp="1"/>
-          </p:cNvSpPr>
-          <p:nvPr>
-            <p:ph idx="1"/>
-          </p:nvPr>
-        </p:nvSpPr>
-        <p:spPr/>
-        <p:txBody>
-          <a:bodyPr/>
-          <a:lstStyle/>
-          <a:p>
-            <a:r>
-              <a:rPr lang="en-US" smtClean="0"/>
-              <a:t>Tổng quan đề tài nghiên cứu</a:t>
-            </a:r>
-          </a:p>
-          <a:p>
-            <a:r>
-              <a:rPr lang="en-US" smtClean="0"/>
-              <a:t>Khảo sát hiện trạng</a:t>
-            </a:r>
-          </a:p>
-          <a:p>
-            <a:r>
-              <a:rPr lang="en-US" smtClean="0"/>
-              <a:t>Xây dựng hệ thống quản lý tương tác</a:t>
-            </a:r>
-          </a:p>
-          <a:p>
-            <a:r>
-              <a:rPr lang="en-US" smtClean="0"/>
-              <a:t>Hướng phát triển</a:t>
-            </a:r>
-            <a:endParaRPr lang="en-US"/>
-          </a:p>
-        </p:txBody>
-      </p:sp>
-    </p:spTree>
-    <p:extLst>
-      <p:ext uri="{BB962C8B-B14F-4D97-AF65-F5344CB8AC3E}">
-        <p14:creationId xmlns:p14="http://schemas.microsoft.com/office/powerpoint/2010/main" val="3329876487"/>
-      </p:ext>
-    </p:extLst>
-  </p:cSld>
-  <p:clrMapOvr>
-    <a:masterClrMapping/>
-  </p:clrMapOvr>
-</p:sld>
-</file>
-
 <file path=ppt/slides/slide3.xml><?xml version="1.0" encoding="utf-8"?>
 <p:sld xmlns:a="http://schemas.openxmlformats.org/drawingml/2006/main" xmlns:r="http://schemas.openxmlformats.org/officeDocument/2006/relationships" xmlns:p="http://schemas.openxmlformats.org/presentationml/2006/main">
   <p:cSld>
@@ -5001,7 +6799,11 @@
           <a:p>
             <a:r>
               <a:rPr lang="en-US" smtClean="0"/>
-              <a:t>Khảo sát hiện trạng</a:t>
+              <a:t>Khảo sát hiện </a:t>
+            </a:r>
+            <a:r>
+              <a:rPr lang="en-US" smtClean="0"/>
+              <a:t>trạng(1/3)</a:t>
             </a:r>
             <a:endParaRPr lang="en-US"/>
           </a:p>
@@ -5022,6 +6824,66 @@
           <a:bodyPr/>
           <a:lstStyle/>
           <a:p>
+            <a:r>
+              <a:rPr lang="en-US" smtClean="0"/>
+              <a:t>Cơ sở lý thuyết</a:t>
+            </a:r>
+          </a:p>
+          <a:p>
+            <a:pPr lvl="1"/>
+            <a:r>
+              <a:rPr lang="en-US" smtClean="0"/>
+              <a:t>Nhu cầu hợp tác làm việc </a:t>
+            </a:r>
+            <a:r>
+              <a:rPr lang="en-US" smtClean="0">
+                <a:sym typeface="Wingdings" pitchFamily="2" charset="2"/>
+              </a:rPr>
+              <a:t> khó thống nhất</a:t>
+            </a:r>
+          </a:p>
+          <a:p>
+            <a:pPr lvl="1"/>
+            <a:r>
+              <a:rPr lang="en-US" smtClean="0">
+                <a:sym typeface="Wingdings" pitchFamily="2" charset="2"/>
+              </a:rPr>
+              <a:t>Công cụ hỗ trợ</a:t>
+            </a:r>
+          </a:p>
+          <a:p>
+            <a:pPr lvl="2"/>
+            <a:r>
+              <a:rPr lang="en-US" smtClean="0">
+                <a:sym typeface="Wingdings" pitchFamily="2" charset="2"/>
+              </a:rPr>
+              <a:t>Dựa trên mô hình</a:t>
+            </a:r>
+          </a:p>
+          <a:p>
+            <a:pPr lvl="2"/>
+            <a:r>
+              <a:rPr lang="en-US" smtClean="0">
+                <a:sym typeface="Wingdings" pitchFamily="2" charset="2"/>
+              </a:rPr>
+              <a:t>Dựa trên quy trình</a:t>
+            </a:r>
+          </a:p>
+          <a:p>
+            <a:pPr lvl="2"/>
+            <a:r>
+              <a:rPr lang="en-US" smtClean="0">
+                <a:sym typeface="Wingdings" pitchFamily="2" charset="2"/>
+              </a:rPr>
+              <a:t>Dựa trên nhận thức</a:t>
+            </a:r>
+          </a:p>
+          <a:p>
+            <a:pPr lvl="2"/>
+            <a:endParaRPr lang="en-US" smtClean="0"/>
+          </a:p>
+          <a:p>
+            <a:pPr lvl="1"/>
             <a:endParaRPr lang="en-US"/>
           </a:p>
         </p:txBody>
@@ -5068,14 +6930,16 @@
         </p:nvSpPr>
         <p:spPr/>
         <p:txBody>
-          <a:bodyPr>
-            <a:normAutofit fontScale="90000"/>
-          </a:bodyPr>
-          <a:lstStyle/>
-          <a:p>
-            <a:r>
-              <a:rPr lang="en-US" smtClean="0"/>
-              <a:t>Xây dựng hệ thống quản lý tương tác</a:t>
+          <a:bodyPr/>
+          <a:lstStyle/>
+          <a:p>
+            <a:r>
+              <a:rPr lang="en-US" smtClean="0"/>
+              <a:t>Khảo sát hiện </a:t>
+            </a:r>
+            <a:r>
+              <a:rPr lang="en-US" smtClean="0"/>
+              <a:t>trạng(2/3)</a:t>
             </a:r>
             <a:endParaRPr lang="en-US"/>
           </a:p>
@@ -5096,6 +6960,51 @@
           <a:bodyPr/>
           <a:lstStyle/>
           <a:p>
+            <a:r>
+              <a:rPr lang="en-US" smtClean="0"/>
+              <a:t>Team foundation server (TFS)</a:t>
+            </a:r>
+            <a:endParaRPr lang="en-US" smtClean="0">
+              <a:sym typeface="Wingdings" pitchFamily="2" charset="2"/>
+            </a:endParaRPr>
+          </a:p>
+          <a:p>
+            <a:pPr lvl="2"/>
+            <a:r>
+              <a:rPr lang="en-US" smtClean="0"/>
+              <a:t>Quản lý dự án</a:t>
+            </a:r>
+          </a:p>
+          <a:p>
+            <a:pPr lvl="2"/>
+            <a:r>
+              <a:rPr lang="en-US" smtClean="0"/>
+              <a:t>Quản lý công việc</a:t>
+            </a:r>
+          </a:p>
+          <a:p>
+            <a:pPr lvl="2"/>
+            <a:r>
+              <a:rPr lang="en-US" smtClean="0"/>
+              <a:t>Quản lý cấu hình</a:t>
+            </a:r>
+          </a:p>
+          <a:p>
+            <a:pPr lvl="2"/>
+            <a:r>
+              <a:rPr lang="en-US" smtClean="0"/>
+              <a:t>Tạo báo cáo</a:t>
+            </a:r>
+          </a:p>
+          <a:p>
+            <a:pPr lvl="2"/>
+            <a:r>
+              <a:rPr lang="en-US" smtClean="0"/>
+              <a:t>Xây dựng nhóm</a:t>
+            </a:r>
+          </a:p>
+          <a:p>
+            <a:pPr lvl="1"/>
             <a:endParaRPr lang="en-US"/>
           </a:p>
         </p:txBody>
@@ -5103,7 +7012,7 @@
     </p:spTree>
     <p:extLst>
       <p:ext uri="{BB962C8B-B14F-4D97-AF65-F5344CB8AC3E}">
-        <p14:creationId xmlns:p14="http://schemas.microsoft.com/office/powerpoint/2010/main" val="1502502686"/>
+        <p14:creationId xmlns:p14="http://schemas.microsoft.com/office/powerpoint/2010/main" val="4227127705"/>
       </p:ext>
     </p:extLst>
   </p:cSld>
@@ -5147,7 +7056,11 @@
           <a:p>
             <a:r>
               <a:rPr lang="en-US" smtClean="0"/>
-              <a:t>Hướng phát triển</a:t>
+              <a:t>Khảo sát hiện </a:t>
+            </a:r>
+            <a:r>
+              <a:rPr lang="en-US" smtClean="0"/>
+              <a:t>trạng(3/3)</a:t>
             </a:r>
             <a:endParaRPr lang="en-US"/>
           </a:p>
@@ -5168,6 +7081,58 @@
           <a:bodyPr/>
           <a:lstStyle/>
           <a:p>
+            <a:r>
+              <a:rPr lang="en-US" smtClean="0"/>
+              <a:t>Redmine</a:t>
+            </a:r>
+          </a:p>
+          <a:p>
+            <a:pPr lvl="1"/>
+            <a:r>
+              <a:rPr lang="en-US" smtClean="0"/>
+              <a:t>Quản lý vấn đề (requirement, bug, task)</a:t>
+            </a:r>
+          </a:p>
+          <a:p>
+            <a:pPr lvl="1"/>
+            <a:r>
+              <a:rPr lang="en-US" smtClean="0"/>
+              <a:t>Quản lý dự án</a:t>
+            </a:r>
+          </a:p>
+          <a:p>
+            <a:r>
+              <a:rPr lang="en-US" smtClean="0"/>
+              <a:t>Assembla</a:t>
+            </a:r>
+          </a:p>
+          <a:p>
+            <a:pPr lvl="1"/>
+            <a:r>
+              <a:rPr lang="en-US" smtClean="0"/>
+              <a:t>Quản lý nhóm</a:t>
+            </a:r>
+          </a:p>
+          <a:p>
+            <a:pPr lvl="1"/>
+            <a:r>
+              <a:rPr lang="en-US" smtClean="0"/>
+              <a:t>Quản lý tài liệu</a:t>
+            </a:r>
+          </a:p>
+          <a:p>
+            <a:pPr lvl="1"/>
+            <a:r>
+              <a:rPr lang="en-US" smtClean="0"/>
+              <a:t>Phân công công việc</a:t>
+            </a:r>
+          </a:p>
+          <a:p>
+            <a:pPr lvl="1"/>
+            <a:r>
+              <a:rPr lang="en-US" smtClean="0"/>
+              <a:t>Chat</a:t>
+            </a:r>
             <a:endParaRPr lang="en-US"/>
           </a:p>
         </p:txBody>
@@ -5175,7 +7140,7 @@
     </p:spTree>
     <p:extLst>
       <p:ext uri="{BB962C8B-B14F-4D97-AF65-F5344CB8AC3E}">
-        <p14:creationId xmlns:p14="http://schemas.microsoft.com/office/powerpoint/2010/main" val="4024402129"/>
+        <p14:creationId xmlns:p14="http://schemas.microsoft.com/office/powerpoint/2010/main" val="3365698829"/>
       </p:ext>
     </p:extLst>
   </p:cSld>
@@ -5214,73 +7179,82 @@
         </p:nvSpPr>
         <p:spPr/>
         <p:txBody>
-          <a:bodyPr/>
-          <a:lstStyle/>
-          <a:p>
-            <a:endParaRPr lang="en-US"/>
-          </a:p>
-        </p:txBody>
-      </p:sp>
-      <p:pic>
-        <p:nvPicPr>
-          <p:cNvPr id="2050" name="Picture 2" descr="C:\Users\hyga\Desktop\picture\images (1).jpg"/>
-          <p:cNvPicPr>
-            <a:picLocks noGrp="1" noChangeAspect="1" noChangeArrowheads="1"/>
-          </p:cNvPicPr>
+          <a:bodyPr>
+            <a:normAutofit fontScale="90000"/>
+          </a:bodyPr>
+          <a:lstStyle/>
+          <a:p>
+            <a:r>
+              <a:rPr lang="en-US" smtClean="0"/>
+              <a:t>Xây dựng hệ thống quản lý tương tác</a:t>
+            </a:r>
+            <a:endParaRPr lang="en-US"/>
+          </a:p>
+        </p:txBody>
+      </p:sp>
+      <p:sp>
+        <p:nvSpPr>
+          <p:cNvPr id="3" name="Content Placeholder 2"/>
+          <p:cNvSpPr>
+            <a:spLocks noGrp="1"/>
+          </p:cNvSpPr>
           <p:nvPr>
             <p:ph idx="1"/>
           </p:nvPr>
-        </p:nvPicPr>
-        <p:blipFill>
-          <a:blip r:embed="rId2">
-            <a:extLst>
-              <a:ext uri="{28A0092B-C50C-407E-A947-70E740481C1C}">
-                <a14:useLocalDpi xmlns:a14="http://schemas.microsoft.com/office/drawing/2010/main" val="0"/>
-              </a:ext>
-            </a:extLst>
-          </a:blip>
-          <a:srcRect/>
-          <a:stretch>
-            <a:fillRect/>
-          </a:stretch>
-        </p:blipFill>
-        <p:spPr bwMode="auto">
-          <a:xfrm>
-            <a:off x="2971800" y="2057400"/>
-            <a:ext cx="3728142" cy="3711575"/>
-          </a:xfrm>
-          <a:prstGeom prst="rect">
-            <a:avLst/>
-          </a:prstGeom>
-          <a:noFill/>
-          <a:extLst>
-            <a:ext uri="{909E8E84-426E-40DD-AFC4-6F175D3DCCD1}">
-              <a14:hiddenFill xmlns:a14="http://schemas.microsoft.com/office/drawing/2010/main">
-                <a:solidFill>
-                  <a:srgbClr val="FFFFFF"/>
-                </a:solidFill>
-              </a14:hiddenFill>
-            </a:ext>
-          </a:extLst>
-        </p:spPr>
-      </p:pic>
+        </p:nvSpPr>
+        <p:spPr/>
+        <p:txBody>
+          <a:bodyPr/>
+          <a:lstStyle/>
+          <a:p>
+            <a:r>
+              <a:rPr lang="en-US" smtClean="0"/>
+              <a:t>Quản lý quy trình phần mềm</a:t>
+            </a:r>
+          </a:p>
+          <a:p>
+            <a:r>
+              <a:rPr lang="en-US" smtClean="0"/>
+              <a:t>Quản lý dự án</a:t>
+            </a:r>
+          </a:p>
+          <a:p>
+            <a:r>
+              <a:rPr lang="en-US" smtClean="0"/>
+              <a:t>Quản lý lớp học</a:t>
+            </a:r>
+          </a:p>
+          <a:p>
+            <a:r>
+              <a:rPr lang="en-US" smtClean="0"/>
+              <a:t>Quản lý work item</a:t>
+            </a:r>
+          </a:p>
+          <a:p>
+            <a:r>
+              <a:rPr lang="en-US" smtClean="0"/>
+              <a:t>Tương tác nhóm</a:t>
+            </a:r>
+          </a:p>
+          <a:p>
+            <a:r>
+              <a:rPr lang="en-US" smtClean="0"/>
+              <a:t>Quản  lý lịch cá nhân và lịch dự án</a:t>
+            </a:r>
+            <a:endParaRPr lang="en-US"/>
+          </a:p>
+        </p:txBody>
+      </p:sp>
     </p:spTree>
     <p:extLst>
       <p:ext uri="{BB962C8B-B14F-4D97-AF65-F5344CB8AC3E}">
-        <p14:creationId xmlns:p14="http://schemas.microsoft.com/office/powerpoint/2010/main" val="432506298"/>
+        <p14:creationId xmlns:p14="http://schemas.microsoft.com/office/powerpoint/2010/main" val="1502502686"/>
       </p:ext>
     </p:extLst>
   </p:cSld>
   <p:clrMapOvr>
     <a:masterClrMapping/>
   </p:clrMapOvr>
-  <p:timing>
-    <p:tnLst>
-      <p:par>
-        <p:cTn id="1" dur="indefinite" restart="never" nodeType="tmRoot"/>
-      </p:par>
-    </p:tnLst>
-  </p:timing>
 </p:sld>
 </file>
 

</xml_diff>